<commit_message>
Add EEA data update script and search application
- Implemented `update_eea_data.py` to download and import EEA CSV files into SQLite database.
- Added functionality to check for existing data and skip downloads if files already exist.
- Created `search_app.py` for a user-friendly interface to query the EEA E-PRTR database.
- Integrated filtering options for countries, pollutants, and reporting years in the search app.
- Included data visualization features using Plotly for emissions trends and facility mapping.
</commit_message>
<xml_diff>
--- a/WTE_Market_Analysis_2024-2025.pptx
+++ b/WTE_Market_Analysis_2024-2025.pptx
@@ -5,25 +5,25 @@
     <p:sldMasterId id="2147483648" r:id="rId1"/>
   </p:sldMasterIdLst>
   <p:sldIdLst>
-    <p:sldId id="256" r:id="rId7"/>
-    <p:sldId id="257" r:id="rId8"/>
-    <p:sldId id="258" r:id="rId9"/>
-    <p:sldId id="259" r:id="rId10"/>
-    <p:sldId id="260" r:id="rId11"/>
-    <p:sldId id="261" r:id="rId12"/>
-    <p:sldId id="262" r:id="rId13"/>
-    <p:sldId id="263" r:id="rId14"/>
-    <p:sldId id="264" r:id="rId15"/>
-    <p:sldId id="265" r:id="rId16"/>
-    <p:sldId id="266" r:id="rId17"/>
-    <p:sldId id="267" r:id="rId18"/>
-    <p:sldId id="268" r:id="rId19"/>
-    <p:sldId id="269" r:id="rId20"/>
-    <p:sldId id="270" r:id="rId21"/>
-    <p:sldId id="271" r:id="rId22"/>
-    <p:sldId id="272" r:id="rId23"/>
-    <p:sldId id="273" r:id="rId24"/>
-    <p:sldId id="274" r:id="rId25"/>
+    <p:sldId id="256" r:id="rId2"/>
+    <p:sldId id="257" r:id="rId3"/>
+    <p:sldId id="258" r:id="rId4"/>
+    <p:sldId id="259" r:id="rId5"/>
+    <p:sldId id="260" r:id="rId6"/>
+    <p:sldId id="261" r:id="rId7"/>
+    <p:sldId id="262" r:id="rId8"/>
+    <p:sldId id="263" r:id="rId9"/>
+    <p:sldId id="264" r:id="rId10"/>
+    <p:sldId id="265" r:id="rId11"/>
+    <p:sldId id="266" r:id="rId12"/>
+    <p:sldId id="267" r:id="rId13"/>
+    <p:sldId id="268" r:id="rId14"/>
+    <p:sldId id="269" r:id="rId15"/>
+    <p:sldId id="270" r:id="rId16"/>
+    <p:sldId id="271" r:id="rId17"/>
+    <p:sldId id="272" r:id="rId18"/>
+    <p:sldId id="273" r:id="rId19"/>
+    <p:sldId id="274" r:id="rId20"/>
   </p:sldIdLst>
   <p:sldSz cx="9144000" cy="6858000" type="screen4x3"/>
   <p:notesSz cx="6858000" cy="9144000"/>
@@ -122,6 +122,22 @@
       </a:defRPr>
     </a:lvl9pPr>
   </p:defaultTextStyle>
+  <p:extLst>
+    <p:ext uri="{EFAFB233-063F-42B5-8137-9DF3F51BA10A}">
+      <p15:sldGuideLst xmlns:p15="http://schemas.microsoft.com/office/powerpoint/2012/main">
+        <p15:guide id="1" orient="horz" pos="2160">
+          <p15:clr>
+            <a:srgbClr val="A4A3A4"/>
+          </p15:clr>
+        </p15:guide>
+        <p15:guide id="2" pos="2880">
+          <p15:clr>
+            <a:srgbClr val="A4A3A4"/>
+          </p15:clr>
+        </p15:guide>
+      </p15:sldGuideLst>
+    </p:ext>
+  </p:extLst>
 </p:presentation>
 </file>
 
@@ -163,10 +179,9 @@
           <a:lstStyle/>
           <a:p>
             <a:r>
-              <a:rPr lang="en-US" smtClean="0"/>
+              <a:rPr lang="en-US"/>
               <a:t>Click to edit Master title style</a:t>
             </a:r>
-            <a:endParaRPr lang="en-US"/>
           </a:p>
         </p:txBody>
       </p:sp>
@@ -282,10 +297,9 @@
           </a:lstStyle>
           <a:p>
             <a:r>
-              <a:rPr lang="en-US" smtClean="0"/>
+              <a:rPr lang="en-US"/>
               <a:t>Click to edit Master subtitle style</a:t>
             </a:r>
-            <a:endParaRPr lang="en-US"/>
           </a:p>
         </p:txBody>
       </p:sp>
@@ -306,7 +320,7 @@
           <a:p>
             <a:fld id="{5BCAD085-E8A6-8845-BD4E-CB4CCA059FC4}" type="datetimeFigureOut">
               <a:rPr lang="en-US" smtClean="0"/>
-              <a:t>1/27/13</a:t>
+              <a:t>2/19/2026</a:t>
             </a:fld>
             <a:endParaRPr lang="en-US"/>
           </a:p>
@@ -400,10 +414,9 @@
           <a:lstStyle/>
           <a:p>
             <a:r>
-              <a:rPr lang="en-US" smtClean="0"/>
+              <a:rPr lang="en-US"/>
               <a:t>Click to edit Master title style</a:t>
             </a:r>
-            <a:endParaRPr lang="en-US"/>
           </a:p>
         </p:txBody>
       </p:sp>
@@ -424,38 +437,37 @@
           <a:p>
             <a:pPr lvl="0"/>
             <a:r>
-              <a:rPr lang="en-US" smtClean="0"/>
+              <a:rPr lang="en-US"/>
               <a:t>Click to edit Master text styles</a:t>
             </a:r>
           </a:p>
           <a:p>
             <a:pPr lvl="1"/>
             <a:r>
-              <a:rPr lang="en-US" smtClean="0"/>
+              <a:rPr lang="en-US"/>
               <a:t>Second level</a:t>
             </a:r>
           </a:p>
           <a:p>
             <a:pPr lvl="2"/>
             <a:r>
-              <a:rPr lang="en-US" smtClean="0"/>
+              <a:rPr lang="en-US"/>
               <a:t>Third level</a:t>
             </a:r>
           </a:p>
           <a:p>
             <a:pPr lvl="3"/>
             <a:r>
-              <a:rPr lang="en-US" smtClean="0"/>
+              <a:rPr lang="en-US"/>
               <a:t>Fourth level</a:t>
             </a:r>
           </a:p>
           <a:p>
             <a:pPr lvl="4"/>
             <a:r>
-              <a:rPr lang="en-US" smtClean="0"/>
+              <a:rPr lang="en-US"/>
               <a:t>Fifth level</a:t>
             </a:r>
-            <a:endParaRPr lang="en-US"/>
           </a:p>
         </p:txBody>
       </p:sp>
@@ -476,7 +488,7 @@
           <a:p>
             <a:fld id="{5BCAD085-E8A6-8845-BD4E-CB4CCA059FC4}" type="datetimeFigureOut">
               <a:rPr lang="en-US" smtClean="0"/>
-              <a:t>1/27/13</a:t>
+              <a:t>2/19/2026</a:t>
             </a:fld>
             <a:endParaRPr lang="en-US"/>
           </a:p>
@@ -575,10 +587,9 @@
           <a:lstStyle/>
           <a:p>
             <a:r>
-              <a:rPr lang="en-US" smtClean="0"/>
+              <a:rPr lang="en-US"/>
               <a:t>Click to edit Master title style</a:t>
             </a:r>
-            <a:endParaRPr lang="en-US"/>
           </a:p>
         </p:txBody>
       </p:sp>
@@ -604,38 +615,37 @@
           <a:p>
             <a:pPr lvl="0"/>
             <a:r>
-              <a:rPr lang="en-US" smtClean="0"/>
+              <a:rPr lang="en-US"/>
               <a:t>Click to edit Master text styles</a:t>
             </a:r>
           </a:p>
           <a:p>
             <a:pPr lvl="1"/>
             <a:r>
-              <a:rPr lang="en-US" smtClean="0"/>
+              <a:rPr lang="en-US"/>
               <a:t>Second level</a:t>
             </a:r>
           </a:p>
           <a:p>
             <a:pPr lvl="2"/>
             <a:r>
-              <a:rPr lang="en-US" smtClean="0"/>
+              <a:rPr lang="en-US"/>
               <a:t>Third level</a:t>
             </a:r>
           </a:p>
           <a:p>
             <a:pPr lvl="3"/>
             <a:r>
-              <a:rPr lang="en-US" smtClean="0"/>
+              <a:rPr lang="en-US"/>
               <a:t>Fourth level</a:t>
             </a:r>
           </a:p>
           <a:p>
             <a:pPr lvl="4"/>
             <a:r>
-              <a:rPr lang="en-US" smtClean="0"/>
+              <a:rPr lang="en-US"/>
               <a:t>Fifth level</a:t>
             </a:r>
-            <a:endParaRPr lang="en-US"/>
           </a:p>
         </p:txBody>
       </p:sp>
@@ -656,7 +666,7 @@
           <a:p>
             <a:fld id="{5BCAD085-E8A6-8845-BD4E-CB4CCA059FC4}" type="datetimeFigureOut">
               <a:rPr lang="en-US" smtClean="0"/>
-              <a:t>1/27/13</a:t>
+              <a:t>2/19/2026</a:t>
             </a:fld>
             <a:endParaRPr lang="en-US"/>
           </a:p>
@@ -750,10 +760,9 @@
           <a:lstStyle/>
           <a:p>
             <a:r>
-              <a:rPr lang="en-US" smtClean="0"/>
+              <a:rPr lang="en-US"/>
               <a:t>Click to edit Master title style</a:t>
             </a:r>
-            <a:endParaRPr lang="en-US"/>
           </a:p>
         </p:txBody>
       </p:sp>
@@ -774,38 +783,37 @@
           <a:p>
             <a:pPr lvl="0"/>
             <a:r>
-              <a:rPr lang="en-US" smtClean="0"/>
+              <a:rPr lang="en-US"/>
               <a:t>Click to edit Master text styles</a:t>
             </a:r>
           </a:p>
           <a:p>
             <a:pPr lvl="1"/>
             <a:r>
-              <a:rPr lang="en-US" smtClean="0"/>
+              <a:rPr lang="en-US"/>
               <a:t>Second level</a:t>
             </a:r>
           </a:p>
           <a:p>
             <a:pPr lvl="2"/>
             <a:r>
-              <a:rPr lang="en-US" smtClean="0"/>
+              <a:rPr lang="en-US"/>
               <a:t>Third level</a:t>
             </a:r>
           </a:p>
           <a:p>
             <a:pPr lvl="3"/>
             <a:r>
-              <a:rPr lang="en-US" smtClean="0"/>
+              <a:rPr lang="en-US"/>
               <a:t>Fourth level</a:t>
             </a:r>
           </a:p>
           <a:p>
             <a:pPr lvl="4"/>
             <a:r>
-              <a:rPr lang="en-US" smtClean="0"/>
+              <a:rPr lang="en-US"/>
               <a:t>Fifth level</a:t>
             </a:r>
-            <a:endParaRPr lang="en-US"/>
           </a:p>
         </p:txBody>
       </p:sp>
@@ -826,7 +834,7 @@
           <a:p>
             <a:fld id="{5BCAD085-E8A6-8845-BD4E-CB4CCA059FC4}" type="datetimeFigureOut">
               <a:rPr lang="en-US" smtClean="0"/>
-              <a:t>1/27/13</a:t>
+              <a:t>2/19/2026</a:t>
             </a:fld>
             <a:endParaRPr lang="en-US"/>
           </a:p>
@@ -929,10 +937,9 @@
           </a:lstStyle>
           <a:p>
             <a:r>
-              <a:rPr lang="en-US" smtClean="0"/>
+              <a:rPr lang="en-US"/>
               <a:t>Click to edit Master title style</a:t>
             </a:r>
-            <a:endParaRPr lang="en-US"/>
           </a:p>
         </p:txBody>
       </p:sp>
@@ -1049,7 +1056,7 @@
           <a:p>
             <a:pPr lvl="0"/>
             <a:r>
-              <a:rPr lang="en-US" smtClean="0"/>
+              <a:rPr lang="en-US"/>
               <a:t>Click to edit Master text styles</a:t>
             </a:r>
           </a:p>
@@ -1072,7 +1079,7 @@
           <a:p>
             <a:fld id="{5BCAD085-E8A6-8845-BD4E-CB4CCA059FC4}" type="datetimeFigureOut">
               <a:rPr lang="en-US" smtClean="0"/>
-              <a:t>1/27/13</a:t>
+              <a:t>2/19/2026</a:t>
             </a:fld>
             <a:endParaRPr lang="en-US"/>
           </a:p>
@@ -1166,10 +1173,9 @@
           <a:lstStyle/>
           <a:p>
             <a:r>
-              <a:rPr lang="en-US" smtClean="0"/>
+              <a:rPr lang="en-US"/>
               <a:t>Click to edit Master title style</a:t>
             </a:r>
-            <a:endParaRPr lang="en-US"/>
           </a:p>
         </p:txBody>
       </p:sp>
@@ -1223,38 +1229,37 @@
           <a:p>
             <a:pPr lvl="0"/>
             <a:r>
-              <a:rPr lang="en-US" smtClean="0"/>
+              <a:rPr lang="en-US"/>
               <a:t>Click to edit Master text styles</a:t>
             </a:r>
           </a:p>
           <a:p>
             <a:pPr lvl="1"/>
             <a:r>
-              <a:rPr lang="en-US" smtClean="0"/>
+              <a:rPr lang="en-US"/>
               <a:t>Second level</a:t>
             </a:r>
           </a:p>
           <a:p>
             <a:pPr lvl="2"/>
             <a:r>
-              <a:rPr lang="en-US" smtClean="0"/>
+              <a:rPr lang="en-US"/>
               <a:t>Third level</a:t>
             </a:r>
           </a:p>
           <a:p>
             <a:pPr lvl="3"/>
             <a:r>
-              <a:rPr lang="en-US" smtClean="0"/>
+              <a:rPr lang="en-US"/>
               <a:t>Fourth level</a:t>
             </a:r>
           </a:p>
           <a:p>
             <a:pPr lvl="4"/>
             <a:r>
-              <a:rPr lang="en-US" smtClean="0"/>
+              <a:rPr lang="en-US"/>
               <a:t>Fifth level</a:t>
             </a:r>
-            <a:endParaRPr lang="en-US"/>
           </a:p>
         </p:txBody>
       </p:sp>
@@ -1308,38 +1313,37 @@
           <a:p>
             <a:pPr lvl="0"/>
             <a:r>
-              <a:rPr lang="en-US" smtClean="0"/>
+              <a:rPr lang="en-US"/>
               <a:t>Click to edit Master text styles</a:t>
             </a:r>
           </a:p>
           <a:p>
             <a:pPr lvl="1"/>
             <a:r>
-              <a:rPr lang="en-US" smtClean="0"/>
+              <a:rPr lang="en-US"/>
               <a:t>Second level</a:t>
             </a:r>
           </a:p>
           <a:p>
             <a:pPr lvl="2"/>
             <a:r>
-              <a:rPr lang="en-US" smtClean="0"/>
+              <a:rPr lang="en-US"/>
               <a:t>Third level</a:t>
             </a:r>
           </a:p>
           <a:p>
             <a:pPr lvl="3"/>
             <a:r>
-              <a:rPr lang="en-US" smtClean="0"/>
+              <a:rPr lang="en-US"/>
               <a:t>Fourth level</a:t>
             </a:r>
           </a:p>
           <a:p>
             <a:pPr lvl="4"/>
             <a:r>
-              <a:rPr lang="en-US" smtClean="0"/>
+              <a:rPr lang="en-US"/>
               <a:t>Fifth level</a:t>
             </a:r>
-            <a:endParaRPr lang="en-US"/>
           </a:p>
         </p:txBody>
       </p:sp>
@@ -1360,7 +1364,7 @@
           <a:p>
             <a:fld id="{5BCAD085-E8A6-8845-BD4E-CB4CCA059FC4}" type="datetimeFigureOut">
               <a:rPr lang="en-US" smtClean="0"/>
-              <a:t>1/27/13</a:t>
+              <a:t>2/19/2026</a:t>
             </a:fld>
             <a:endParaRPr lang="en-US"/>
           </a:p>
@@ -1458,10 +1462,9 @@
           </a:lstStyle>
           <a:p>
             <a:r>
-              <a:rPr lang="en-US" smtClean="0"/>
+              <a:rPr lang="en-US"/>
               <a:t>Click to edit Master title style</a:t>
             </a:r>
-            <a:endParaRPr lang="en-US"/>
           </a:p>
         </p:txBody>
       </p:sp>
@@ -1524,7 +1527,7 @@
           <a:p>
             <a:pPr lvl="0"/>
             <a:r>
-              <a:rPr lang="en-US" smtClean="0"/>
+              <a:rPr lang="en-US"/>
               <a:t>Click to edit Master text styles</a:t>
             </a:r>
           </a:p>
@@ -1580,38 +1583,37 @@
           <a:p>
             <a:pPr lvl="0"/>
             <a:r>
-              <a:rPr lang="en-US" smtClean="0"/>
+              <a:rPr lang="en-US"/>
               <a:t>Click to edit Master text styles</a:t>
             </a:r>
           </a:p>
           <a:p>
             <a:pPr lvl="1"/>
             <a:r>
-              <a:rPr lang="en-US" smtClean="0"/>
+              <a:rPr lang="en-US"/>
               <a:t>Second level</a:t>
             </a:r>
           </a:p>
           <a:p>
             <a:pPr lvl="2"/>
             <a:r>
-              <a:rPr lang="en-US" smtClean="0"/>
+              <a:rPr lang="en-US"/>
               <a:t>Third level</a:t>
             </a:r>
           </a:p>
           <a:p>
             <a:pPr lvl="3"/>
             <a:r>
-              <a:rPr lang="en-US" smtClean="0"/>
+              <a:rPr lang="en-US"/>
               <a:t>Fourth level</a:t>
             </a:r>
           </a:p>
           <a:p>
             <a:pPr lvl="4"/>
             <a:r>
-              <a:rPr lang="en-US" smtClean="0"/>
+              <a:rPr lang="en-US"/>
               <a:t>Fifth level</a:t>
             </a:r>
-            <a:endParaRPr lang="en-US"/>
           </a:p>
         </p:txBody>
       </p:sp>
@@ -1674,7 +1676,7 @@
           <a:p>
             <a:pPr lvl="0"/>
             <a:r>
-              <a:rPr lang="en-US" smtClean="0"/>
+              <a:rPr lang="en-US"/>
               <a:t>Click to edit Master text styles</a:t>
             </a:r>
           </a:p>
@@ -1730,38 +1732,37 @@
           <a:p>
             <a:pPr lvl="0"/>
             <a:r>
-              <a:rPr lang="en-US" smtClean="0"/>
+              <a:rPr lang="en-US"/>
               <a:t>Click to edit Master text styles</a:t>
             </a:r>
           </a:p>
           <a:p>
             <a:pPr lvl="1"/>
             <a:r>
-              <a:rPr lang="en-US" smtClean="0"/>
+              <a:rPr lang="en-US"/>
               <a:t>Second level</a:t>
             </a:r>
           </a:p>
           <a:p>
             <a:pPr lvl="2"/>
             <a:r>
-              <a:rPr lang="en-US" smtClean="0"/>
+              <a:rPr lang="en-US"/>
               <a:t>Third level</a:t>
             </a:r>
           </a:p>
           <a:p>
             <a:pPr lvl="3"/>
             <a:r>
-              <a:rPr lang="en-US" smtClean="0"/>
+              <a:rPr lang="en-US"/>
               <a:t>Fourth level</a:t>
             </a:r>
           </a:p>
           <a:p>
             <a:pPr lvl="4"/>
             <a:r>
-              <a:rPr lang="en-US" smtClean="0"/>
+              <a:rPr lang="en-US"/>
               <a:t>Fifth level</a:t>
             </a:r>
-            <a:endParaRPr lang="en-US"/>
           </a:p>
         </p:txBody>
       </p:sp>
@@ -1782,7 +1783,7 @@
           <a:p>
             <a:fld id="{5BCAD085-E8A6-8845-BD4E-CB4CCA059FC4}" type="datetimeFigureOut">
               <a:rPr lang="en-US" smtClean="0"/>
-              <a:t>1/27/13</a:t>
+              <a:t>2/19/2026</a:t>
             </a:fld>
             <a:endParaRPr lang="en-US"/>
           </a:p>
@@ -1876,10 +1877,9 @@
           <a:lstStyle/>
           <a:p>
             <a:r>
-              <a:rPr lang="en-US" smtClean="0"/>
+              <a:rPr lang="en-US"/>
               <a:t>Click to edit Master title style</a:t>
             </a:r>
-            <a:endParaRPr lang="en-US"/>
           </a:p>
         </p:txBody>
       </p:sp>
@@ -1900,7 +1900,7 @@
           <a:p>
             <a:fld id="{5BCAD085-E8A6-8845-BD4E-CB4CCA059FC4}" type="datetimeFigureOut">
               <a:rPr lang="en-US" smtClean="0"/>
-              <a:t>1/27/13</a:t>
+              <a:t>2/19/2026</a:t>
             </a:fld>
             <a:endParaRPr lang="en-US"/>
           </a:p>
@@ -1995,7 +1995,7 @@
           <a:p>
             <a:fld id="{5BCAD085-E8A6-8845-BD4E-CB4CCA059FC4}" type="datetimeFigureOut">
               <a:rPr lang="en-US" smtClean="0"/>
-              <a:t>1/27/13</a:t>
+              <a:t>2/19/2026</a:t>
             </a:fld>
             <a:endParaRPr lang="en-US"/>
           </a:p>
@@ -2098,10 +2098,9 @@
           </a:lstStyle>
           <a:p>
             <a:r>
-              <a:rPr lang="en-US" smtClean="0"/>
+              <a:rPr lang="en-US"/>
               <a:t>Click to edit Master title style</a:t>
             </a:r>
-            <a:endParaRPr lang="en-US"/>
           </a:p>
         </p:txBody>
       </p:sp>
@@ -2155,38 +2154,37 @@
           <a:p>
             <a:pPr lvl="0"/>
             <a:r>
-              <a:rPr lang="en-US" smtClean="0"/>
+              <a:rPr lang="en-US"/>
               <a:t>Click to edit Master text styles</a:t>
             </a:r>
           </a:p>
           <a:p>
             <a:pPr lvl="1"/>
             <a:r>
-              <a:rPr lang="en-US" smtClean="0"/>
+              <a:rPr lang="en-US"/>
               <a:t>Second level</a:t>
             </a:r>
           </a:p>
           <a:p>
             <a:pPr lvl="2"/>
             <a:r>
-              <a:rPr lang="en-US" smtClean="0"/>
+              <a:rPr lang="en-US"/>
               <a:t>Third level</a:t>
             </a:r>
           </a:p>
           <a:p>
             <a:pPr lvl="3"/>
             <a:r>
-              <a:rPr lang="en-US" smtClean="0"/>
+              <a:rPr lang="en-US"/>
               <a:t>Fourth level</a:t>
             </a:r>
           </a:p>
           <a:p>
             <a:pPr lvl="4"/>
             <a:r>
-              <a:rPr lang="en-US" smtClean="0"/>
+              <a:rPr lang="en-US"/>
               <a:t>Fifth level</a:t>
             </a:r>
-            <a:endParaRPr lang="en-US"/>
           </a:p>
         </p:txBody>
       </p:sp>
@@ -2249,7 +2247,7 @@
           <a:p>
             <a:pPr lvl="0"/>
             <a:r>
-              <a:rPr lang="en-US" smtClean="0"/>
+              <a:rPr lang="en-US"/>
               <a:t>Click to edit Master text styles</a:t>
             </a:r>
           </a:p>
@@ -2272,7 +2270,7 @@
           <a:p>
             <a:fld id="{5BCAD085-E8A6-8845-BD4E-CB4CCA059FC4}" type="datetimeFigureOut">
               <a:rPr lang="en-US" smtClean="0"/>
-              <a:t>1/27/13</a:t>
+              <a:t>2/19/2026</a:t>
             </a:fld>
             <a:endParaRPr lang="en-US"/>
           </a:p>
@@ -2375,10 +2373,9 @@
           </a:lstStyle>
           <a:p>
             <a:r>
-              <a:rPr lang="en-US" smtClean="0"/>
+              <a:rPr lang="en-US"/>
               <a:t>Click to edit Master title style</a:t>
             </a:r>
-            <a:endParaRPr lang="en-US"/>
           </a:p>
         </p:txBody>
       </p:sp>
@@ -2502,7 +2499,7 @@
           <a:p>
             <a:pPr lvl="0"/>
             <a:r>
-              <a:rPr lang="en-US" smtClean="0"/>
+              <a:rPr lang="en-US"/>
               <a:t>Click to edit Master text styles</a:t>
             </a:r>
           </a:p>
@@ -2525,7 +2522,7 @@
           <a:p>
             <a:fld id="{5BCAD085-E8A6-8845-BD4E-CB4CCA059FC4}" type="datetimeFigureOut">
               <a:rPr lang="en-US" smtClean="0"/>
-              <a:t>1/27/13</a:t>
+              <a:t>2/19/2026</a:t>
             </a:fld>
             <a:endParaRPr lang="en-US"/>
           </a:p>
@@ -2634,10 +2631,9 @@
           <a:lstStyle/>
           <a:p>
             <a:r>
-              <a:rPr lang="en-US" smtClean="0"/>
+              <a:rPr lang="en-US"/>
               <a:t>Click to edit Master title style</a:t>
             </a:r>
-            <a:endParaRPr lang="en-US"/>
           </a:p>
         </p:txBody>
       </p:sp>
@@ -2668,38 +2664,37 @@
           <a:p>
             <a:pPr lvl="0"/>
             <a:r>
-              <a:rPr lang="en-US" smtClean="0"/>
+              <a:rPr lang="en-US"/>
               <a:t>Click to edit Master text styles</a:t>
             </a:r>
           </a:p>
           <a:p>
             <a:pPr lvl="1"/>
             <a:r>
-              <a:rPr lang="en-US" smtClean="0"/>
+              <a:rPr lang="en-US"/>
               <a:t>Second level</a:t>
             </a:r>
           </a:p>
           <a:p>
             <a:pPr lvl="2"/>
             <a:r>
-              <a:rPr lang="en-US" smtClean="0"/>
+              <a:rPr lang="en-US"/>
               <a:t>Third level</a:t>
             </a:r>
           </a:p>
           <a:p>
             <a:pPr lvl="3"/>
             <a:r>
-              <a:rPr lang="en-US" smtClean="0"/>
+              <a:rPr lang="en-US"/>
               <a:t>Fourth level</a:t>
             </a:r>
           </a:p>
           <a:p>
             <a:pPr lvl="4"/>
             <a:r>
-              <a:rPr lang="en-US" smtClean="0"/>
+              <a:rPr lang="en-US"/>
               <a:t>Fifth level</a:t>
             </a:r>
-            <a:endParaRPr lang="en-US"/>
           </a:p>
         </p:txBody>
       </p:sp>
@@ -2738,7 +2733,7 @@
           <a:p>
             <a:fld id="{5BCAD085-E8A6-8845-BD4E-CB4CCA059FC4}" type="datetimeFigureOut">
               <a:rPr lang="en-US" smtClean="0"/>
-              <a:t>1/27/13</a:t>
+              <a:t>2/19/2026</a:t>
             </a:fld>
             <a:endParaRPr lang="en-US"/>
           </a:p>
@@ -3097,7 +3092,7 @@
 </file>
 
 <file path=ppt/slides/slide1.xml><?xml version="1.0" encoding="utf-8"?>
-<p:sld xmlns:a="http://schemas.openxmlformats.org/drawingml/2006/main" xmlns:p="http://schemas.openxmlformats.org/presentationml/2006/main" xmlns:r="http://schemas.openxmlformats.org/officeDocument/2006/relationships">
+<p:sld xmlns:a="http://schemas.openxmlformats.org/drawingml/2006/main" xmlns:r="http://schemas.openxmlformats.org/officeDocument/2006/relationships" xmlns:p="http://schemas.openxmlformats.org/presentationml/2006/main">
   <p:cSld>
     <p:bg>
       <p:bgPr>
@@ -3113,7 +3108,14 @@
         <p:cNvGrpSpPr/>
         <p:nvPr/>
       </p:nvGrpSpPr>
-      <p:grpSpPr/>
+      <p:grpSpPr>
+        <a:xfrm>
+          <a:off x="0" y="0"/>
+          <a:ext cx="0" cy="0"/>
+          <a:chOff x="0" y="0"/>
+          <a:chExt cx="0" cy="0"/>
+        </a:xfrm>
+      </p:grpSpPr>
       <p:sp>
         <p:nvSpPr>
           <p:cNvPr id="2" name="TextBox 1"/>
@@ -3193,7 +3195,7 @@
 </file>
 
 <file path=ppt/slides/slide10.xml><?xml version="1.0" encoding="utf-8"?>
-<p:sld xmlns:a="http://schemas.openxmlformats.org/drawingml/2006/main" xmlns:p="http://schemas.openxmlformats.org/presentationml/2006/main" xmlns:r="http://schemas.openxmlformats.org/officeDocument/2006/relationships">
+<p:sld xmlns:a="http://schemas.openxmlformats.org/drawingml/2006/main" xmlns:r="http://schemas.openxmlformats.org/officeDocument/2006/relationships" xmlns:p="http://schemas.openxmlformats.org/presentationml/2006/main">
   <p:cSld>
     <p:spTree>
       <p:nvGrpSpPr>
@@ -3201,7 +3203,14 @@
         <p:cNvGrpSpPr/>
         <p:nvPr/>
       </p:nvGrpSpPr>
-      <p:grpSpPr/>
+      <p:grpSpPr>
+        <a:xfrm>
+          <a:off x="0" y="0"/>
+          <a:ext cx="0" cy="0"/>
+          <a:chOff x="0" y="0"/>
+          <a:chExt cx="0" cy="0"/>
+        </a:xfrm>
+      </p:grpSpPr>
       <p:sp>
         <p:nvSpPr>
           <p:cNvPr id="2" name="TextBox 1"/>
@@ -3276,6 +3285,7 @@
           <a:lstStyle/>
           <a:p>
             <a:pPr algn="ctr"/>
+            <a:endParaRPr/>
           </a:p>
         </p:txBody>
       </p:sp>
@@ -3386,6 +3396,7 @@
                 </a:solidFill>
               </a:defRPr>
             </a:pPr>
+            <a:endParaRPr/>
           </a:p>
           <a:p>
             <a:pPr>
@@ -3452,7 +3463,7 @@
 </file>
 
 <file path=ppt/slides/slide11.xml><?xml version="1.0" encoding="utf-8"?>
-<p:sld xmlns:a="http://schemas.openxmlformats.org/drawingml/2006/main" xmlns:p="http://schemas.openxmlformats.org/presentationml/2006/main" xmlns:r="http://schemas.openxmlformats.org/officeDocument/2006/relationships">
+<p:sld xmlns:a="http://schemas.openxmlformats.org/drawingml/2006/main" xmlns:r="http://schemas.openxmlformats.org/officeDocument/2006/relationships" xmlns:p="http://schemas.openxmlformats.org/presentationml/2006/main">
   <p:cSld>
     <p:spTree>
       <p:nvGrpSpPr>
@@ -3460,7 +3471,14 @@
         <p:cNvGrpSpPr/>
         <p:nvPr/>
       </p:nvGrpSpPr>
-      <p:grpSpPr/>
+      <p:grpSpPr>
+        <a:xfrm>
+          <a:off x="0" y="0"/>
+          <a:ext cx="0" cy="0"/>
+          <a:chOff x="0" y="0"/>
+          <a:chExt cx="0" cy="0"/>
+        </a:xfrm>
+      </p:grpSpPr>
       <p:sp>
         <p:nvSpPr>
           <p:cNvPr id="2" name="TextBox 1"/>
@@ -3535,6 +3553,7 @@
           <a:lstStyle/>
           <a:p>
             <a:pPr algn="ctr"/>
+            <a:endParaRPr/>
           </a:p>
         </p:txBody>
       </p:sp>
@@ -3591,6 +3610,7 @@
                 </a:solidFill>
               </a:defRPr>
             </a:pPr>
+            <a:endParaRPr/>
           </a:p>
           <a:p>
             <a:pPr>
@@ -3624,6 +3644,7 @@
                 </a:solidFill>
               </a:defRPr>
             </a:pPr>
+            <a:endParaRPr/>
           </a:p>
           <a:p>
             <a:pPr>
@@ -3657,6 +3678,7 @@
                 </a:solidFill>
               </a:defRPr>
             </a:pPr>
+            <a:endParaRPr/>
           </a:p>
           <a:p>
             <a:pPr>
@@ -3690,6 +3712,7 @@
                 </a:solidFill>
               </a:defRPr>
             </a:pPr>
+            <a:endParaRPr/>
           </a:p>
         </p:txBody>
       </p:sp>
@@ -3702,7 +3725,7 @@
 </file>
 
 <file path=ppt/slides/slide12.xml><?xml version="1.0" encoding="utf-8"?>
-<p:sld xmlns:a="http://schemas.openxmlformats.org/drawingml/2006/main" xmlns:p="http://schemas.openxmlformats.org/presentationml/2006/main" xmlns:r="http://schemas.openxmlformats.org/officeDocument/2006/relationships">
+<p:sld xmlns:a="http://schemas.openxmlformats.org/drawingml/2006/main" xmlns:r="http://schemas.openxmlformats.org/officeDocument/2006/relationships" xmlns:p="http://schemas.openxmlformats.org/presentationml/2006/main">
   <p:cSld>
     <p:spTree>
       <p:nvGrpSpPr>
@@ -3710,7 +3733,14 @@
         <p:cNvGrpSpPr/>
         <p:nvPr/>
       </p:nvGrpSpPr>
-      <p:grpSpPr/>
+      <p:grpSpPr>
+        <a:xfrm>
+          <a:off x="0" y="0"/>
+          <a:ext cx="0" cy="0"/>
+          <a:chOff x="0" y="0"/>
+          <a:chExt cx="0" cy="0"/>
+        </a:xfrm>
+      </p:grpSpPr>
       <p:sp>
         <p:nvSpPr>
           <p:cNvPr id="2" name="TextBox 1"/>
@@ -3785,6 +3815,7 @@
           <a:lstStyle/>
           <a:p>
             <a:pPr algn="ctr"/>
+            <a:endParaRPr/>
           </a:p>
         </p:txBody>
       </p:sp>
@@ -3859,6 +3890,7 @@
                 </a:solidFill>
               </a:defRPr>
             </a:pPr>
+            <a:endParaRPr/>
           </a:p>
           <a:p>
             <a:pPr>
@@ -3961,7 +3993,7 @@
 </file>
 
 <file path=ppt/slides/slide13.xml><?xml version="1.0" encoding="utf-8"?>
-<p:sld xmlns:a="http://schemas.openxmlformats.org/drawingml/2006/main" xmlns:p="http://schemas.openxmlformats.org/presentationml/2006/main" xmlns:r="http://schemas.openxmlformats.org/officeDocument/2006/relationships">
+<p:sld xmlns:a="http://schemas.openxmlformats.org/drawingml/2006/main" xmlns:r="http://schemas.openxmlformats.org/officeDocument/2006/relationships" xmlns:p="http://schemas.openxmlformats.org/presentationml/2006/main">
   <p:cSld>
     <p:spTree>
       <p:nvGrpSpPr>
@@ -3969,7 +4001,14 @@
         <p:cNvGrpSpPr/>
         <p:nvPr/>
       </p:nvGrpSpPr>
-      <p:grpSpPr/>
+      <p:grpSpPr>
+        <a:xfrm>
+          <a:off x="0" y="0"/>
+          <a:ext cx="0" cy="0"/>
+          <a:chOff x="0" y="0"/>
+          <a:chExt cx="0" cy="0"/>
+        </a:xfrm>
+      </p:grpSpPr>
       <p:sp>
         <p:nvSpPr>
           <p:cNvPr id="2" name="TextBox 1"/>
@@ -4044,6 +4083,7 @@
           <a:lstStyle/>
           <a:p>
             <a:pPr algn="ctr"/>
+            <a:endParaRPr/>
           </a:p>
         </p:txBody>
       </p:sp>
@@ -4136,6 +4176,7 @@
                 </a:solidFill>
               </a:defRPr>
             </a:pPr>
+            <a:endParaRPr/>
           </a:p>
           <a:p>
             <a:pPr>
@@ -4187,6 +4228,7 @@
                 </a:solidFill>
               </a:defRPr>
             </a:pPr>
+            <a:endParaRPr/>
           </a:p>
           <a:p>
             <a:pPr>
@@ -4235,7 +4277,7 @@
 </file>
 
 <file path=ppt/slides/slide14.xml><?xml version="1.0" encoding="utf-8"?>
-<p:sld xmlns:a="http://schemas.openxmlformats.org/drawingml/2006/main" xmlns:p="http://schemas.openxmlformats.org/presentationml/2006/main" xmlns:r="http://schemas.openxmlformats.org/officeDocument/2006/relationships">
+<p:sld xmlns:a="http://schemas.openxmlformats.org/drawingml/2006/main" xmlns:r="http://schemas.openxmlformats.org/officeDocument/2006/relationships" xmlns:p="http://schemas.openxmlformats.org/presentationml/2006/main">
   <p:cSld>
     <p:spTree>
       <p:nvGrpSpPr>
@@ -4243,7 +4285,14 @@
         <p:cNvGrpSpPr/>
         <p:nvPr/>
       </p:nvGrpSpPr>
-      <p:grpSpPr/>
+      <p:grpSpPr>
+        <a:xfrm>
+          <a:off x="0" y="0"/>
+          <a:ext cx="0" cy="0"/>
+          <a:chOff x="0" y="0"/>
+          <a:chExt cx="0" cy="0"/>
+        </a:xfrm>
+      </p:grpSpPr>
       <p:sp>
         <p:nvSpPr>
           <p:cNvPr id="2" name="TextBox 1"/>
@@ -4318,6 +4367,7 @@
           <a:lstStyle/>
           <a:p>
             <a:pPr algn="ctr"/>
+            <a:endParaRPr/>
           </a:p>
         </p:txBody>
       </p:sp>
@@ -4392,6 +4442,7 @@
                 </a:solidFill>
               </a:defRPr>
             </a:pPr>
+            <a:endParaRPr/>
           </a:p>
           <a:p>
             <a:pPr>
@@ -4461,6 +4512,7 @@
                 </a:solidFill>
               </a:defRPr>
             </a:pPr>
+            <a:endParaRPr/>
           </a:p>
           <a:p>
             <a:pPr>
@@ -4509,7 +4561,7 @@
 </file>
 
 <file path=ppt/slides/slide15.xml><?xml version="1.0" encoding="utf-8"?>
-<p:sld xmlns:a="http://schemas.openxmlformats.org/drawingml/2006/main" xmlns:p="http://schemas.openxmlformats.org/presentationml/2006/main" xmlns:r="http://schemas.openxmlformats.org/officeDocument/2006/relationships">
+<p:sld xmlns:a="http://schemas.openxmlformats.org/drawingml/2006/main" xmlns:r="http://schemas.openxmlformats.org/officeDocument/2006/relationships" xmlns:p="http://schemas.openxmlformats.org/presentationml/2006/main">
   <p:cSld>
     <p:spTree>
       <p:nvGrpSpPr>
@@ -4517,7 +4569,14 @@
         <p:cNvGrpSpPr/>
         <p:nvPr/>
       </p:nvGrpSpPr>
-      <p:grpSpPr/>
+      <p:grpSpPr>
+        <a:xfrm>
+          <a:off x="0" y="0"/>
+          <a:ext cx="0" cy="0"/>
+          <a:chOff x="0" y="0"/>
+          <a:chExt cx="0" cy="0"/>
+        </a:xfrm>
+      </p:grpSpPr>
       <p:sp>
         <p:nvSpPr>
           <p:cNvPr id="2" name="TextBox 1"/>
@@ -4592,6 +4651,7 @@
           <a:lstStyle/>
           <a:p>
             <a:pPr algn="ctr"/>
+            <a:endParaRPr/>
           </a:p>
         </p:txBody>
       </p:sp>
@@ -4702,6 +4762,7 @@
                 </a:solidFill>
               </a:defRPr>
             </a:pPr>
+            <a:endParaRPr/>
           </a:p>
           <a:p>
             <a:pPr>
@@ -4750,7 +4811,7 @@
 </file>
 
 <file path=ppt/slides/slide16.xml><?xml version="1.0" encoding="utf-8"?>
-<p:sld xmlns:a="http://schemas.openxmlformats.org/drawingml/2006/main" xmlns:p="http://schemas.openxmlformats.org/presentationml/2006/main" xmlns:r="http://schemas.openxmlformats.org/officeDocument/2006/relationships">
+<p:sld xmlns:a="http://schemas.openxmlformats.org/drawingml/2006/main" xmlns:r="http://schemas.openxmlformats.org/officeDocument/2006/relationships" xmlns:p="http://schemas.openxmlformats.org/presentationml/2006/main">
   <p:cSld>
     <p:spTree>
       <p:nvGrpSpPr>
@@ -4758,7 +4819,14 @@
         <p:cNvGrpSpPr/>
         <p:nvPr/>
       </p:nvGrpSpPr>
-      <p:grpSpPr/>
+      <p:grpSpPr>
+        <a:xfrm>
+          <a:off x="0" y="0"/>
+          <a:ext cx="0" cy="0"/>
+          <a:chOff x="0" y="0"/>
+          <a:chExt cx="0" cy="0"/>
+        </a:xfrm>
+      </p:grpSpPr>
       <p:sp>
         <p:nvSpPr>
           <p:cNvPr id="2" name="TextBox 1"/>
@@ -4833,6 +4901,7 @@
           <a:lstStyle/>
           <a:p>
             <a:pPr algn="ctr"/>
+            <a:endParaRPr/>
           </a:p>
         </p:txBody>
       </p:sp>
@@ -4907,6 +4976,7 @@
                 </a:solidFill>
               </a:defRPr>
             </a:pPr>
+            <a:endParaRPr/>
           </a:p>
           <a:p>
             <a:pPr>
@@ -4958,6 +5028,7 @@
                 </a:solidFill>
               </a:defRPr>
             </a:pPr>
+            <a:endParaRPr/>
           </a:p>
           <a:p>
             <a:pPr>
@@ -5006,7 +5077,7 @@
 </file>
 
 <file path=ppt/slides/slide17.xml><?xml version="1.0" encoding="utf-8"?>
-<p:sld xmlns:a="http://schemas.openxmlformats.org/drawingml/2006/main" xmlns:p="http://schemas.openxmlformats.org/presentationml/2006/main" xmlns:r="http://schemas.openxmlformats.org/officeDocument/2006/relationships">
+<p:sld xmlns:a="http://schemas.openxmlformats.org/drawingml/2006/main" xmlns:r="http://schemas.openxmlformats.org/officeDocument/2006/relationships" xmlns:p="http://schemas.openxmlformats.org/presentationml/2006/main">
   <p:cSld>
     <p:spTree>
       <p:nvGrpSpPr>
@@ -5014,7 +5085,14 @@
         <p:cNvGrpSpPr/>
         <p:nvPr/>
       </p:nvGrpSpPr>
-      <p:grpSpPr/>
+      <p:grpSpPr>
+        <a:xfrm>
+          <a:off x="0" y="0"/>
+          <a:ext cx="0" cy="0"/>
+          <a:chOff x="0" y="0"/>
+          <a:chExt cx="0" cy="0"/>
+        </a:xfrm>
+      </p:grpSpPr>
       <p:sp>
         <p:nvSpPr>
           <p:cNvPr id="2" name="TextBox 1"/>
@@ -5089,6 +5167,7 @@
           <a:lstStyle/>
           <a:p>
             <a:pPr algn="ctr"/>
+            <a:endParaRPr/>
           </a:p>
         </p:txBody>
       </p:sp>
@@ -5163,6 +5242,7 @@
                 </a:solidFill>
               </a:defRPr>
             </a:pPr>
+            <a:endParaRPr/>
           </a:p>
           <a:p>
             <a:pPr>
@@ -5214,6 +5294,7 @@
                 </a:solidFill>
               </a:defRPr>
             </a:pPr>
+            <a:endParaRPr/>
           </a:p>
           <a:p>
             <a:pPr>
@@ -5262,7 +5343,7 @@
 </file>
 
 <file path=ppt/slides/slide18.xml><?xml version="1.0" encoding="utf-8"?>
-<p:sld xmlns:a="http://schemas.openxmlformats.org/drawingml/2006/main" xmlns:p="http://schemas.openxmlformats.org/presentationml/2006/main" xmlns:r="http://schemas.openxmlformats.org/officeDocument/2006/relationships">
+<p:sld xmlns:a="http://schemas.openxmlformats.org/drawingml/2006/main" xmlns:r="http://schemas.openxmlformats.org/officeDocument/2006/relationships" xmlns:p="http://schemas.openxmlformats.org/presentationml/2006/main">
   <p:cSld>
     <p:spTree>
       <p:nvGrpSpPr>
@@ -5270,7 +5351,14 @@
         <p:cNvGrpSpPr/>
         <p:nvPr/>
       </p:nvGrpSpPr>
-      <p:grpSpPr/>
+      <p:grpSpPr>
+        <a:xfrm>
+          <a:off x="0" y="0"/>
+          <a:ext cx="0" cy="0"/>
+          <a:chOff x="0" y="0"/>
+          <a:chExt cx="0" cy="0"/>
+        </a:xfrm>
+      </p:grpSpPr>
       <p:sp>
         <p:nvSpPr>
           <p:cNvPr id="2" name="TextBox 1"/>
@@ -5345,6 +5433,7 @@
           <a:lstStyle/>
           <a:p>
             <a:pPr algn="ctr"/>
+            <a:endParaRPr/>
           </a:p>
         </p:txBody>
       </p:sp>
@@ -5401,6 +5490,7 @@
                 </a:solidFill>
               </a:defRPr>
             </a:pPr>
+            <a:endParaRPr/>
           </a:p>
           <a:p>
             <a:pPr>
@@ -5434,6 +5524,7 @@
                 </a:solidFill>
               </a:defRPr>
             </a:pPr>
+            <a:endParaRPr/>
           </a:p>
           <a:p>
             <a:pPr>
@@ -5467,6 +5558,7 @@
                 </a:solidFill>
               </a:defRPr>
             </a:pPr>
+            <a:endParaRPr/>
           </a:p>
           <a:p>
             <a:pPr>
@@ -5497,7 +5589,7 @@
 </file>
 
 <file path=ppt/slides/slide19.xml><?xml version="1.0" encoding="utf-8"?>
-<p:sld xmlns:a="http://schemas.openxmlformats.org/drawingml/2006/main" xmlns:p="http://schemas.openxmlformats.org/presentationml/2006/main" xmlns:r="http://schemas.openxmlformats.org/officeDocument/2006/relationships">
+<p:sld xmlns:a="http://schemas.openxmlformats.org/drawingml/2006/main" xmlns:r="http://schemas.openxmlformats.org/officeDocument/2006/relationships" xmlns:p="http://schemas.openxmlformats.org/presentationml/2006/main">
   <p:cSld>
     <p:bg>
       <p:bgPr>
@@ -5513,7 +5605,14 @@
         <p:cNvGrpSpPr/>
         <p:nvPr/>
       </p:nvGrpSpPr>
-      <p:grpSpPr/>
+      <p:grpSpPr>
+        <a:xfrm>
+          <a:off x="0" y="0"/>
+          <a:ext cx="0" cy="0"/>
+          <a:chOff x="0" y="0"/>
+          <a:chExt cx="0" cy="0"/>
+        </a:xfrm>
+      </p:grpSpPr>
       <p:sp>
         <p:nvSpPr>
           <p:cNvPr id="2" name="TextBox 1"/>
@@ -5600,7 +5699,7 @@
 </file>
 
 <file path=ppt/slides/slide2.xml><?xml version="1.0" encoding="utf-8"?>
-<p:sld xmlns:a="http://schemas.openxmlformats.org/drawingml/2006/main" xmlns:p="http://schemas.openxmlformats.org/presentationml/2006/main" xmlns:r="http://schemas.openxmlformats.org/officeDocument/2006/relationships">
+<p:sld xmlns:a="http://schemas.openxmlformats.org/drawingml/2006/main" xmlns:r="http://schemas.openxmlformats.org/officeDocument/2006/relationships" xmlns:p="http://schemas.openxmlformats.org/presentationml/2006/main">
   <p:cSld>
     <p:spTree>
       <p:nvGrpSpPr>
@@ -5608,7 +5707,14 @@
         <p:cNvGrpSpPr/>
         <p:nvPr/>
       </p:nvGrpSpPr>
-      <p:grpSpPr/>
+      <p:grpSpPr>
+        <a:xfrm>
+          <a:off x="0" y="0"/>
+          <a:ext cx="0" cy="0"/>
+          <a:chOff x="0" y="0"/>
+          <a:chExt cx="0" cy="0"/>
+        </a:xfrm>
+      </p:grpSpPr>
       <p:sp>
         <p:nvSpPr>
           <p:cNvPr id="2" name="TextBox 1"/>
@@ -5683,6 +5789,7 @@
           <a:lstStyle/>
           <a:p>
             <a:pPr algn="ctr"/>
+            <a:endParaRPr/>
           </a:p>
         </p:txBody>
       </p:sp>
@@ -5757,6 +5864,7 @@
                 </a:solidFill>
               </a:defRPr>
             </a:pPr>
+            <a:endParaRPr/>
           </a:p>
           <a:p>
             <a:pPr>
@@ -5826,6 +5934,7 @@
                 </a:solidFill>
               </a:defRPr>
             </a:pPr>
+            <a:endParaRPr/>
           </a:p>
           <a:p>
             <a:pPr>
@@ -5892,7 +6001,7 @@
 </file>
 
 <file path=ppt/slides/slide3.xml><?xml version="1.0" encoding="utf-8"?>
-<p:sld xmlns:a="http://schemas.openxmlformats.org/drawingml/2006/main" xmlns:p="http://schemas.openxmlformats.org/presentationml/2006/main" xmlns:r="http://schemas.openxmlformats.org/officeDocument/2006/relationships">
+<p:sld xmlns:a="http://schemas.openxmlformats.org/drawingml/2006/main" xmlns:r="http://schemas.openxmlformats.org/officeDocument/2006/relationships" xmlns:p="http://schemas.openxmlformats.org/presentationml/2006/main">
   <p:cSld>
     <p:spTree>
       <p:nvGrpSpPr>
@@ -5900,7 +6009,14 @@
         <p:cNvGrpSpPr/>
         <p:nvPr/>
       </p:nvGrpSpPr>
-      <p:grpSpPr/>
+      <p:grpSpPr>
+        <a:xfrm>
+          <a:off x="0" y="0"/>
+          <a:ext cx="0" cy="0"/>
+          <a:chOff x="0" y="0"/>
+          <a:chExt cx="0" cy="0"/>
+        </a:xfrm>
+      </p:grpSpPr>
       <p:sp>
         <p:nvSpPr>
           <p:cNvPr id="2" name="TextBox 1"/>
@@ -5975,6 +6091,7 @@
           <a:lstStyle/>
           <a:p>
             <a:pPr algn="ctr"/>
+            <a:endParaRPr/>
           </a:p>
         </p:txBody>
       </p:sp>
@@ -6049,6 +6166,7 @@
                 </a:solidFill>
               </a:defRPr>
             </a:pPr>
+            <a:endParaRPr/>
           </a:p>
           <a:p>
             <a:pPr>
@@ -6151,7 +6269,7 @@
 </file>
 
 <file path=ppt/slides/slide4.xml><?xml version="1.0" encoding="utf-8"?>
-<p:sld xmlns:a="http://schemas.openxmlformats.org/drawingml/2006/main" xmlns:p="http://schemas.openxmlformats.org/presentationml/2006/main" xmlns:r="http://schemas.openxmlformats.org/officeDocument/2006/relationships">
+<p:sld xmlns:a="http://schemas.openxmlformats.org/drawingml/2006/main" xmlns:r="http://schemas.openxmlformats.org/officeDocument/2006/relationships" xmlns:p="http://schemas.openxmlformats.org/presentationml/2006/main">
   <p:cSld>
     <p:spTree>
       <p:nvGrpSpPr>
@@ -6159,7 +6277,14 @@
         <p:cNvGrpSpPr/>
         <p:nvPr/>
       </p:nvGrpSpPr>
-      <p:grpSpPr/>
+      <p:grpSpPr>
+        <a:xfrm>
+          <a:off x="0" y="0"/>
+          <a:ext cx="0" cy="0"/>
+          <a:chOff x="0" y="0"/>
+          <a:chExt cx="0" cy="0"/>
+        </a:xfrm>
+      </p:grpSpPr>
       <p:sp>
         <p:nvSpPr>
           <p:cNvPr id="2" name="TextBox 1"/>
@@ -6234,6 +6359,7 @@
           <a:lstStyle/>
           <a:p>
             <a:pPr algn="ctr"/>
+            <a:endParaRPr/>
           </a:p>
         </p:txBody>
       </p:sp>
@@ -6308,6 +6434,7 @@
                 </a:solidFill>
               </a:defRPr>
             </a:pPr>
+            <a:endParaRPr/>
           </a:p>
           <a:p>
             <a:pPr>
@@ -6359,6 +6486,7 @@
                 </a:solidFill>
               </a:defRPr>
             </a:pPr>
+            <a:endParaRPr/>
           </a:p>
           <a:p>
             <a:pPr>
@@ -6425,7 +6553,7 @@
 </file>
 
 <file path=ppt/slides/slide5.xml><?xml version="1.0" encoding="utf-8"?>
-<p:sld xmlns:a="http://schemas.openxmlformats.org/drawingml/2006/main" xmlns:p="http://schemas.openxmlformats.org/presentationml/2006/main" xmlns:r="http://schemas.openxmlformats.org/officeDocument/2006/relationships">
+<p:sld xmlns:a="http://schemas.openxmlformats.org/drawingml/2006/main" xmlns:r="http://schemas.openxmlformats.org/officeDocument/2006/relationships" xmlns:p="http://schemas.openxmlformats.org/presentationml/2006/main">
   <p:cSld>
     <p:spTree>
       <p:nvGrpSpPr>
@@ -6433,7 +6561,14 @@
         <p:cNvGrpSpPr/>
         <p:nvPr/>
       </p:nvGrpSpPr>
-      <p:grpSpPr/>
+      <p:grpSpPr>
+        <a:xfrm>
+          <a:off x="0" y="0"/>
+          <a:ext cx="0" cy="0"/>
+          <a:chOff x="0" y="0"/>
+          <a:chExt cx="0" cy="0"/>
+        </a:xfrm>
+      </p:grpSpPr>
       <p:sp>
         <p:nvSpPr>
           <p:cNvPr id="2" name="TextBox 1"/>
@@ -6508,6 +6643,7 @@
           <a:lstStyle/>
           <a:p>
             <a:pPr algn="ctr"/>
+            <a:endParaRPr/>
           </a:p>
         </p:txBody>
       </p:sp>
@@ -6600,6 +6736,7 @@
                 </a:solidFill>
               </a:defRPr>
             </a:pPr>
+            <a:endParaRPr/>
           </a:p>
           <a:p>
             <a:pPr>
@@ -6684,7 +6821,7 @@
 </file>
 
 <file path=ppt/slides/slide6.xml><?xml version="1.0" encoding="utf-8"?>
-<p:sld xmlns:a="http://schemas.openxmlformats.org/drawingml/2006/main" xmlns:p="http://schemas.openxmlformats.org/presentationml/2006/main" xmlns:r="http://schemas.openxmlformats.org/officeDocument/2006/relationships">
+<p:sld xmlns:a="http://schemas.openxmlformats.org/drawingml/2006/main" xmlns:r="http://schemas.openxmlformats.org/officeDocument/2006/relationships" xmlns:p="http://schemas.openxmlformats.org/presentationml/2006/main">
   <p:cSld>
     <p:spTree>
       <p:nvGrpSpPr>
@@ -6692,7 +6829,14 @@
         <p:cNvGrpSpPr/>
         <p:nvPr/>
       </p:nvGrpSpPr>
-      <p:grpSpPr/>
+      <p:grpSpPr>
+        <a:xfrm>
+          <a:off x="0" y="0"/>
+          <a:ext cx="0" cy="0"/>
+          <a:chOff x="0" y="0"/>
+          <a:chExt cx="0" cy="0"/>
+        </a:xfrm>
+      </p:grpSpPr>
       <p:sp>
         <p:nvSpPr>
           <p:cNvPr id="2" name="TextBox 1"/>
@@ -6767,6 +6911,7 @@
           <a:lstStyle/>
           <a:p>
             <a:pPr algn="ctr"/>
+            <a:endParaRPr/>
           </a:p>
         </p:txBody>
       </p:sp>
@@ -6859,6 +7004,7 @@
                 </a:solidFill>
               </a:defRPr>
             </a:pPr>
+            <a:endParaRPr/>
           </a:p>
           <a:p>
             <a:pPr>
@@ -6943,7 +7089,7 @@
 </file>
 
 <file path=ppt/slides/slide7.xml><?xml version="1.0" encoding="utf-8"?>
-<p:sld xmlns:a="http://schemas.openxmlformats.org/drawingml/2006/main" xmlns:p="http://schemas.openxmlformats.org/presentationml/2006/main" xmlns:r="http://schemas.openxmlformats.org/officeDocument/2006/relationships">
+<p:sld xmlns:a="http://schemas.openxmlformats.org/drawingml/2006/main" xmlns:r="http://schemas.openxmlformats.org/officeDocument/2006/relationships" xmlns:p="http://schemas.openxmlformats.org/presentationml/2006/main">
   <p:cSld>
     <p:spTree>
       <p:nvGrpSpPr>
@@ -6951,7 +7097,14 @@
         <p:cNvGrpSpPr/>
         <p:nvPr/>
       </p:nvGrpSpPr>
-      <p:grpSpPr/>
+      <p:grpSpPr>
+        <a:xfrm>
+          <a:off x="0" y="0"/>
+          <a:ext cx="0" cy="0"/>
+          <a:chOff x="0" y="0"/>
+          <a:chExt cx="0" cy="0"/>
+        </a:xfrm>
+      </p:grpSpPr>
       <p:sp>
         <p:nvSpPr>
           <p:cNvPr id="2" name="TextBox 1"/>
@@ -7026,6 +7179,7 @@
           <a:lstStyle/>
           <a:p>
             <a:pPr algn="ctr"/>
+            <a:endParaRPr/>
           </a:p>
         </p:txBody>
       </p:sp>
@@ -7118,6 +7272,7 @@
                 </a:solidFill>
               </a:defRPr>
             </a:pPr>
+            <a:endParaRPr/>
           </a:p>
           <a:p>
             <a:pPr>
@@ -7187,6 +7342,7 @@
                 </a:solidFill>
               </a:defRPr>
             </a:pPr>
+            <a:endParaRPr/>
           </a:p>
           <a:p>
             <a:pPr>
@@ -7235,7 +7391,7 @@
 </file>
 
 <file path=ppt/slides/slide8.xml><?xml version="1.0" encoding="utf-8"?>
-<p:sld xmlns:a="http://schemas.openxmlformats.org/drawingml/2006/main" xmlns:p="http://schemas.openxmlformats.org/presentationml/2006/main" xmlns:r="http://schemas.openxmlformats.org/officeDocument/2006/relationships">
+<p:sld xmlns:a="http://schemas.openxmlformats.org/drawingml/2006/main" xmlns:r="http://schemas.openxmlformats.org/officeDocument/2006/relationships" xmlns:p="http://schemas.openxmlformats.org/presentationml/2006/main">
   <p:cSld>
     <p:spTree>
       <p:nvGrpSpPr>
@@ -7243,7 +7399,14 @@
         <p:cNvGrpSpPr/>
         <p:nvPr/>
       </p:nvGrpSpPr>
-      <p:grpSpPr/>
+      <p:grpSpPr>
+        <a:xfrm>
+          <a:off x="0" y="0"/>
+          <a:ext cx="0" cy="0"/>
+          <a:chOff x="0" y="0"/>
+          <a:chExt cx="0" cy="0"/>
+        </a:xfrm>
+      </p:grpSpPr>
       <p:sp>
         <p:nvSpPr>
           <p:cNvPr id="2" name="TextBox 1"/>
@@ -7318,6 +7481,7 @@
           <a:lstStyle/>
           <a:p>
             <a:pPr algn="ctr"/>
+            <a:endParaRPr/>
           </a:p>
         </p:txBody>
       </p:sp>
@@ -7410,6 +7574,7 @@
                 </a:solidFill>
               </a:defRPr>
             </a:pPr>
+            <a:endParaRPr/>
           </a:p>
           <a:p>
             <a:pPr>
@@ -7479,6 +7644,7 @@
                 </a:solidFill>
               </a:defRPr>
             </a:pPr>
+            <a:endParaRPr/>
           </a:p>
           <a:p>
             <a:pPr>
@@ -7527,7 +7693,7 @@
 </file>
 
 <file path=ppt/slides/slide9.xml><?xml version="1.0" encoding="utf-8"?>
-<p:sld xmlns:a="http://schemas.openxmlformats.org/drawingml/2006/main" xmlns:p="http://schemas.openxmlformats.org/presentationml/2006/main" xmlns:r="http://schemas.openxmlformats.org/officeDocument/2006/relationships">
+<p:sld xmlns:a="http://schemas.openxmlformats.org/drawingml/2006/main" xmlns:r="http://schemas.openxmlformats.org/officeDocument/2006/relationships" xmlns:p="http://schemas.openxmlformats.org/presentationml/2006/main">
   <p:cSld>
     <p:spTree>
       <p:nvGrpSpPr>
@@ -7535,7 +7701,14 @@
         <p:cNvGrpSpPr/>
         <p:nvPr/>
       </p:nvGrpSpPr>
-      <p:grpSpPr/>
+      <p:grpSpPr>
+        <a:xfrm>
+          <a:off x="0" y="0"/>
+          <a:ext cx="0" cy="0"/>
+          <a:chOff x="0" y="0"/>
+          <a:chExt cx="0" cy="0"/>
+        </a:xfrm>
+      </p:grpSpPr>
       <p:sp>
         <p:nvSpPr>
           <p:cNvPr id="2" name="TextBox 1"/>
@@ -7610,6 +7783,7 @@
           <a:lstStyle/>
           <a:p>
             <a:pPr algn="ctr"/>
+            <a:endParaRPr/>
           </a:p>
         </p:txBody>
       </p:sp>
@@ -7702,6 +7876,7 @@
                 </a:solidFill>
               </a:defRPr>
             </a:pPr>
+            <a:endParaRPr/>
           </a:p>
           <a:p>
             <a:pPr>
@@ -7771,6 +7946,7 @@
                 </a:solidFill>
               </a:defRPr>
             </a:pPr>
+            <a:endParaRPr/>
           </a:p>
           <a:p>
             <a:pPr>
@@ -8118,4 +8294,24 @@
   </a:objectDefaults>
   <a:extraClrSchemeLst/>
 </a:theme>
+</file>
+
+<file path=ppt/webextensions/taskpanes.xml><?xml version="1.0" encoding="utf-8"?>
+<wetp:taskpanes xmlns:wetp="http://schemas.microsoft.com/office/webextensions/taskpanes/2010/11">
+  <wetp:taskpane dockstate="right" visibility="0" width="350" row="0">
+    <wetp:webextensionref xmlns:r="http://schemas.openxmlformats.org/officeDocument/2006/relationships" r:id="rId1"/>
+  </wetp:taskpane>
+</wetp:taskpanes>
+</file>
+
+<file path=ppt/webextensions/webextension1.xml><?xml version="1.0" encoding="utf-8"?>
+<we:webextension xmlns:we="http://schemas.microsoft.com/office/webextensions/webextension/2010/11" id="{B0059A7A-FABD-4F01-B0A4-FEFBF3F66E4D}">
+  <we:reference id="wa200010001" version="1.0.0.0" store="sv-SE" storeType="OMEX"/>
+  <we:alternateReferences>
+    <we:reference id="WA200010001" version="1.0.0.0" store="WA200010001" storeType="OMEX"/>
+  </we:alternateReferences>
+  <we:properties/>
+  <we:bindings/>
+  <we:snapshot xmlns:r="http://schemas.openxmlformats.org/officeDocument/2006/relationships"/>
+</we:webextension>
 </file>
</xml_diff>